<commit_message>
Can connect/disconnect, implemented lock.wait and notify
</commit_message>
<xml_diff>
--- a/bin/Crazyflie JavaFX client.pptx
+++ b/bin/Crazyflie JavaFX client.pptx
@@ -105,6 +105,11 @@
       </a:defRPr>
     </a:lvl9pPr>
   </p:defaultTextStyle>
+  <p:extLst>
+    <p:ext uri="{EFAFB233-063F-42B5-8137-9DF3F51BA10A}">
+      <p15:sldGuideLst xmlns:p15="http://schemas.microsoft.com/office/powerpoint/2012/main"/>
+    </p:ext>
+  </p:extLst>
 </p:presentation>
 </file>
 
@@ -255,7 +260,7 @@
           <a:p>
             <a:fld id="{F0DE98F6-02B7-45E7-8823-B335CB14FDA9}" type="datetimeFigureOut">
               <a:rPr lang="en-US" smtClean="0"/>
-              <a:t>9/25/2022</a:t>
+              <a:t>9/27/2022</a:t>
             </a:fld>
             <a:endParaRPr lang="en-US"/>
           </a:p>
@@ -453,7 +458,7 @@
           <a:p>
             <a:fld id="{F0DE98F6-02B7-45E7-8823-B335CB14FDA9}" type="datetimeFigureOut">
               <a:rPr lang="en-US" smtClean="0"/>
-              <a:t>9/25/2022</a:t>
+              <a:t>9/27/2022</a:t>
             </a:fld>
             <a:endParaRPr lang="en-US"/>
           </a:p>
@@ -661,7 +666,7 @@
           <a:p>
             <a:fld id="{F0DE98F6-02B7-45E7-8823-B335CB14FDA9}" type="datetimeFigureOut">
               <a:rPr lang="en-US" smtClean="0"/>
-              <a:t>9/25/2022</a:t>
+              <a:t>9/27/2022</a:t>
             </a:fld>
             <a:endParaRPr lang="en-US"/>
           </a:p>
@@ -859,7 +864,7 @@
           <a:p>
             <a:fld id="{F0DE98F6-02B7-45E7-8823-B335CB14FDA9}" type="datetimeFigureOut">
               <a:rPr lang="en-US" smtClean="0"/>
-              <a:t>9/25/2022</a:t>
+              <a:t>9/27/2022</a:t>
             </a:fld>
             <a:endParaRPr lang="en-US"/>
           </a:p>
@@ -1134,7 +1139,7 @@
           <a:p>
             <a:fld id="{F0DE98F6-02B7-45E7-8823-B335CB14FDA9}" type="datetimeFigureOut">
               <a:rPr lang="en-US" smtClean="0"/>
-              <a:t>9/25/2022</a:t>
+              <a:t>9/27/2022</a:t>
             </a:fld>
             <a:endParaRPr lang="en-US"/>
           </a:p>
@@ -1399,7 +1404,7 @@
           <a:p>
             <a:fld id="{F0DE98F6-02B7-45E7-8823-B335CB14FDA9}" type="datetimeFigureOut">
               <a:rPr lang="en-US" smtClean="0"/>
-              <a:t>9/25/2022</a:t>
+              <a:t>9/27/2022</a:t>
             </a:fld>
             <a:endParaRPr lang="en-US"/>
           </a:p>
@@ -1811,7 +1816,7 @@
           <a:p>
             <a:fld id="{F0DE98F6-02B7-45E7-8823-B335CB14FDA9}" type="datetimeFigureOut">
               <a:rPr lang="en-US" smtClean="0"/>
-              <a:t>9/25/2022</a:t>
+              <a:t>9/27/2022</a:t>
             </a:fld>
             <a:endParaRPr lang="en-US"/>
           </a:p>
@@ -1952,7 +1957,7 @@
           <a:p>
             <a:fld id="{F0DE98F6-02B7-45E7-8823-B335CB14FDA9}" type="datetimeFigureOut">
               <a:rPr lang="en-US" smtClean="0"/>
-              <a:t>9/25/2022</a:t>
+              <a:t>9/27/2022</a:t>
             </a:fld>
             <a:endParaRPr lang="en-US"/>
           </a:p>
@@ -2065,7 +2070,7 @@
           <a:p>
             <a:fld id="{F0DE98F6-02B7-45E7-8823-B335CB14FDA9}" type="datetimeFigureOut">
               <a:rPr lang="en-US" smtClean="0"/>
-              <a:t>9/25/2022</a:t>
+              <a:t>9/27/2022</a:t>
             </a:fld>
             <a:endParaRPr lang="en-US"/>
           </a:p>
@@ -2376,7 +2381,7 @@
           <a:p>
             <a:fld id="{F0DE98F6-02B7-45E7-8823-B335CB14FDA9}" type="datetimeFigureOut">
               <a:rPr lang="en-US" smtClean="0"/>
-              <a:t>9/25/2022</a:t>
+              <a:t>9/27/2022</a:t>
             </a:fld>
             <a:endParaRPr lang="en-US"/>
           </a:p>
@@ -2664,7 +2669,7 @@
           <a:p>
             <a:fld id="{F0DE98F6-02B7-45E7-8823-B335CB14FDA9}" type="datetimeFigureOut">
               <a:rPr lang="en-US" smtClean="0"/>
-              <a:t>9/25/2022</a:t>
+              <a:t>9/27/2022</a:t>
             </a:fld>
             <a:endParaRPr lang="en-US"/>
           </a:p>
@@ -2905,7 +2910,7 @@
           <a:p>
             <a:fld id="{F0DE98F6-02B7-45E7-8823-B335CB14FDA9}" type="datetimeFigureOut">
               <a:rPr lang="en-US" smtClean="0"/>
-              <a:t>9/25/2022</a:t>
+              <a:t>9/27/2022</a:t>
             </a:fld>
             <a:endParaRPr lang="en-US"/>
           </a:p>
@@ -3966,56 +3971,6 @@
               <a:t>Webservice/API</a:t>
             </a:r>
             <a:endParaRPr lang="en-US" dirty="0"/>
-          </a:p>
-        </p:txBody>
-      </p:sp>
-      <p:sp>
-        <p:nvSpPr>
-          <p:cNvPr id="20" name="Arrow: Left-Up 19">
-            <a:extLst>
-              <a:ext uri="{FF2B5EF4-FFF2-40B4-BE49-F238E27FC236}">
-                <a16:creationId xmlns:a16="http://schemas.microsoft.com/office/drawing/2014/main" id="{FD8613F6-D7BB-407B-BB90-2CA4DD9C24DF}"/>
-              </a:ext>
-            </a:extLst>
-          </p:cNvPr>
-          <p:cNvSpPr/>
-          <p:nvPr/>
-        </p:nvSpPr>
-        <p:spPr>
-          <a:xfrm rot="10800000">
-            <a:off x="5001369" y="645791"/>
-            <a:ext cx="1824303" cy="974178"/>
-          </a:xfrm>
-          <a:prstGeom prst="leftUpArrow">
-            <a:avLst>
-              <a:gd name="adj1" fmla="val 8676"/>
-              <a:gd name="adj2" fmla="val 25000"/>
-              <a:gd name="adj3" fmla="val 21735"/>
-            </a:avLst>
-          </a:prstGeom>
-        </p:spPr>
-        <p:style>
-          <a:lnRef idx="2">
-            <a:schemeClr val="accent1">
-              <a:shade val="50000"/>
-            </a:schemeClr>
-          </a:lnRef>
-          <a:fillRef idx="1">
-            <a:schemeClr val="accent1"/>
-          </a:fillRef>
-          <a:effectRef idx="0">
-            <a:schemeClr val="accent1"/>
-          </a:effectRef>
-          <a:fontRef idx="minor">
-            <a:schemeClr val="lt1"/>
-          </a:fontRef>
-        </p:style>
-        <p:txBody>
-          <a:bodyPr rtlCol="0" anchor="ctr"/>
-          <a:lstStyle/>
-          <a:p>
-            <a:pPr algn="ctr"/>
-            <a:endParaRPr lang="en-US"/>
           </a:p>
         </p:txBody>
       </p:sp>

</xml_diff>